<commit_message>
25 grids, distance round to the second decimal
</commit_message>
<xml_diff>
--- a/grid.pptx
+++ b/grid.pptx
@@ -104,6 +104,11 @@
       </a:defRPr>
     </a:lvl9pPr>
   </p:defaultTextStyle>
+  <p:extLst>
+    <p:ext uri="{EFAFB233-063F-42B5-8137-9DF3F51BA10A}">
+      <p15:sldGuideLst xmlns:p15="http://schemas.microsoft.com/office/powerpoint/2012/main"/>
+    </p:ext>
+  </p:extLst>
 </p:presentation>
 </file>
 
@@ -2975,7 +2980,7 @@
               <p:nvPr>
                 <p:extLst>
                   <p:ext uri="{D42A27DB-BD31-4B8C-83A1-F6EECF244321}">
-                    <p14:modId xmlns:p14="http://schemas.microsoft.com/office/powerpoint/2010/main" val="2512188551"/>
+                    <p14:modId xmlns:p14="http://schemas.microsoft.com/office/powerpoint/2010/main" val="1414143669"/>
                   </p:ext>
                 </p:extLst>
               </p:nvPr>
@@ -3107,7 +3112,7 @@
                               <a:latin typeface="Times New Roman" panose="02020603050405020304" pitchFamily="18" charset="0"/>
                               <a:cs typeface="Times New Roman" panose="02020603050405020304" pitchFamily="18" charset="0"/>
                             </a:rPr>
-                            <a:t>1</a:t>
+                            <a:t>1.00</a:t>
                           </a:r>
                         </a:p>
                         <a:p>
@@ -3181,7 +3186,7 @@
                               <a:latin typeface="Times New Roman" panose="02020603050405020304" pitchFamily="18" charset="0"/>
                               <a:cs typeface="Times New Roman" panose="02020603050405020304" pitchFamily="18" charset="0"/>
                             </a:rPr>
-                            <a:t>2</a:t>
+                            <a:t>2.00</a:t>
                           </a:r>
                         </a:p>
                         <a:p>
@@ -3238,7 +3243,7 @@
                               <a:ea typeface="+mn-ea"/>
                               <a:cs typeface="+mn-cs"/>
                             </a:rPr>
-                            <a:t>   0,3</a:t>
+                            <a:t>  0,3</a:t>
                           </a:r>
                         </a:p>
                         <a:p>
@@ -3250,7 +3255,7 @@
                               </a:solidFill>
                               <a:latin typeface="+mn-lt"/>
                             </a:rPr>
-                            <a:t>3</a:t>
+                            <a:t>3.00</a:t>
                           </a:r>
                         </a:p>
                         <a:p>
@@ -3320,7 +3325,7 @@
                               <a:latin typeface="Times New Roman" panose="02020603050405020304" pitchFamily="18" charset="0"/>
                               <a:cs typeface="Times New Roman" panose="02020603050405020304" pitchFamily="18" charset="0"/>
                             </a:rPr>
-                            <a:t>4</a:t>
+                            <a:t>4.00</a:t>
                           </a:r>
                         </a:p>
                         <a:p>
@@ -3391,7 +3396,7 @@
                               <a:latin typeface="Times New Roman" panose="02020603050405020304" pitchFamily="18" charset="0"/>
                               <a:cs typeface="Times New Roman" panose="02020603050405020304" pitchFamily="18" charset="0"/>
                             </a:rPr>
-                            <a:t>5</a:t>
+                            <a:t>5.00</a:t>
                           </a:r>
                         </a:p>
                         <a:p>
@@ -5496,7 +5501,7 @@
                               <a:ea typeface="+mn-ea"/>
                               <a:cs typeface="Times New Roman" panose="02020603050405020304" pitchFamily="18" charset="0"/>
                             </a:rPr>
-                            <a:t>5</a:t>
+                            <a:t>5.00</a:t>
                           </a:r>
                         </a:p>
                         <a:p>
@@ -6096,7 +6101,7 @@
                               <a:ea typeface="+mn-ea"/>
                               <a:cs typeface="Times New Roman" panose="02020603050405020304" pitchFamily="18" charset="0"/>
                             </a:rPr>
-                            <a:t>5</a:t>
+                            <a:t>5.00</a:t>
                           </a:r>
                         </a:p>
                         <a:p>
@@ -6443,7 +6448,7 @@
               <p:nvPr>
                 <p:extLst>
                   <p:ext uri="{D42A27DB-BD31-4B8C-83A1-F6EECF244321}">
-                    <p14:modId xmlns:p14="http://schemas.microsoft.com/office/powerpoint/2010/main" val="2512188551"/>
+                    <p14:modId xmlns:p14="http://schemas.microsoft.com/office/powerpoint/2010/main" val="1414143669"/>
                   </p:ext>
                 </p:extLst>
               </p:nvPr>
@@ -6575,7 +6580,7 @@
                               <a:latin typeface="Times New Roman" panose="02020603050405020304" pitchFamily="18" charset="0"/>
                               <a:cs typeface="Times New Roman" panose="02020603050405020304" pitchFamily="18" charset="0"/>
                             </a:rPr>
-                            <a:t>1</a:t>
+                            <a:t>1.00</a:t>
                           </a:r>
                         </a:p>
                         <a:p>
@@ -6649,7 +6654,7 @@
                               <a:latin typeface="Times New Roman" panose="02020603050405020304" pitchFamily="18" charset="0"/>
                               <a:cs typeface="Times New Roman" panose="02020603050405020304" pitchFamily="18" charset="0"/>
                             </a:rPr>
-                            <a:t>2</a:t>
+                            <a:t>2.00</a:t>
                           </a:r>
                         </a:p>
                         <a:p>
@@ -6706,7 +6711,7 @@
                               <a:ea typeface="+mn-ea"/>
                               <a:cs typeface="+mn-cs"/>
                             </a:rPr>
-                            <a:t>   0,3</a:t>
+                            <a:t>  0,3</a:t>
                           </a:r>
                         </a:p>
                         <a:p>
@@ -6718,7 +6723,7 @@
                               </a:solidFill>
                               <a:latin typeface="+mn-lt"/>
                             </a:rPr>
-                            <a:t>3</a:t>
+                            <a:t>3.00</a:t>
                           </a:r>
                         </a:p>
                         <a:p>
@@ -6788,7 +6793,7 @@
                               <a:latin typeface="Times New Roman" panose="02020603050405020304" pitchFamily="18" charset="0"/>
                               <a:cs typeface="Times New Roman" panose="02020603050405020304" pitchFamily="18" charset="0"/>
                             </a:rPr>
-                            <a:t>4</a:t>
+                            <a:t>4.00</a:t>
                           </a:r>
                         </a:p>
                         <a:p>
@@ -6859,7 +6864,7 @@
                               <a:latin typeface="Times New Roman" panose="02020603050405020304" pitchFamily="18" charset="0"/>
                               <a:cs typeface="Times New Roman" panose="02020603050405020304" pitchFamily="18" charset="0"/>
                             </a:rPr>
-                            <a:t>5</a:t>
+                            <a:t>5.00</a:t>
                           </a:r>
                         </a:p>
                         <a:p>
@@ -8402,7 +8407,7 @@
                               <a:ea typeface="+mn-ea"/>
                               <a:cs typeface="Times New Roman" panose="02020603050405020304" pitchFamily="18" charset="0"/>
                             </a:rPr>
-                            <a:t>5</a:t>
+                            <a:t>5.00</a:t>
                           </a:r>
                         </a:p>
                         <a:p>
@@ -9002,7 +9007,7 @@
                               <a:ea typeface="+mn-ea"/>
                               <a:cs typeface="Times New Roman" panose="02020603050405020304" pitchFamily="18" charset="0"/>
                             </a:rPr>
-                            <a:t>5</a:t>
+                            <a:t>5.00</a:t>
                           </a:r>
                         </a:p>
                         <a:p>

</xml_diff>